<commit_message>
After deleting un-necessary cells from yfinance_EDA
</commit_message>
<xml_diff>
--- a/PPT/Final Project Forecasting ppt 25-02-2022.pptx
+++ b/PPT/Final Project Forecasting ppt 25-02-2022.pptx
@@ -292,7 +292,7 @@
       <p15:sldGuideLst xmlns:p15="http://schemas.microsoft.com/office/powerpoint/2012/main"/>
     </p:ext>
     <p:ext uri="http://customooxmlschemas.google.com/">
-      <go:slidesCustomData xmlns="" xmlns:mc="http://schemas.openxmlformats.org/markup-compatibility/2006" xmlns:mv="urn:schemas-microsoft-com:mac:vml" xmlns:c="http://schemas.openxmlformats.org/drawingml/2006/chart" xmlns:dgm="http://schemas.openxmlformats.org/drawingml/2006/diagram" xmlns:o="urn:schemas-microsoft-com:office:office" xmlns:v="urn:schemas-microsoft-com:vml" xmlns:pvml="urn:schemas-microsoft-com:office:powerpoint" xmlns:com="http://schemas.openxmlformats.org/drawingml/2006/compatibility" xmlns:p14="http://schemas.microsoft.com/office/powerpoint/2010/main" xmlns:p15="http://schemas.microsoft.com/office/powerpoint/2012/main" xmlns:ahyp="http://schemas.microsoft.com/office/drawing/2018/hyperlinkcolor" xmlns:go="http://customooxmlschemas.google.com/" r:id="rId59" roundtripDataSignature="AMtx7mgu3U6QXx27ruFiz2cn4H4bCCWHoQ=="/>
+      <go:slidesCustomData xmlns:go="http://customooxmlschemas.google.com/" xmlns:ahyp="http://schemas.microsoft.com/office/drawing/2018/hyperlinkcolor" xmlns:p15="http://schemas.microsoft.com/office/powerpoint/2012/main" xmlns:p14="http://schemas.microsoft.com/office/powerpoint/2010/main" xmlns:com="http://schemas.openxmlformats.org/drawingml/2006/compatibility" xmlns:pvml="urn:schemas-microsoft-com:office:powerpoint" xmlns:v="urn:schemas-microsoft-com:vml" xmlns:o="urn:schemas-microsoft-com:office:office" xmlns:dgm="http://schemas.openxmlformats.org/drawingml/2006/diagram" xmlns:c="http://schemas.openxmlformats.org/drawingml/2006/chart" xmlns:mv="urn:schemas-microsoft-com:mac:vml" xmlns:mc="http://schemas.openxmlformats.org/markup-compatibility/2006" xmlns="" r:id="rId59" roundtripDataSignature="AMtx7mgu3U6QXx27ruFiz2cn4H4bCCWHoQ=="/>
     </p:ext>
   </p:extLst>
 </p:presentation>
@@ -9820,7 +9820,7 @@
                   <a:schemeClr val="accent6"/>
                 </a:solidFill>
               </a:rPr>
-              <a:t>BANKRUPTCY  PREVENTION</a:t>
+              <a:t>STOCK MARKET DATA ANALYSIS</a:t>
             </a:r>
             <a:br>
               <a:rPr lang="en-US" sz="2800" dirty="0">
@@ -9862,7 +9862,7 @@
                 <a:cs typeface="Calibri"/>
                 <a:sym typeface="Calibri"/>
               </a:rPr>
-              <a:t>(  Project Group – P78 , Team Number – 03 )</a:t>
+              <a:t>(  Project Group – P97 , Team Number – 02 )</a:t>
             </a:r>
             <a:endParaRPr dirty="0"/>
           </a:p>

</xml_diff>